<commit_message>
Update README and Powerpoint with new app link.
</commit_message>
<xml_diff>
--- a/documentation/Rewards presentation (final).pptx
+++ b/documentation/Rewards presentation (final).pptx
@@ -6535,10 +6535,6 @@
           <a:lstStyle/>
           <a:p>
             <a:pPr lvl="0"/>
-            <a:endParaRPr lang="en-US" dirty="0"/>
-          </a:p>
-          <a:p>
-            <a:pPr lvl="0"/>
             <a:r>
               <a:rPr lang="en-US" dirty="0"/>
               <a:t>Authentication</a:t>
@@ -6591,6 +6587,20 @@
             <a:r>
               <a:rPr lang="en-US" dirty="0"/>
               <a:t>Log of past chores completed, and rewards claimed, by date</a:t>
+            </a:r>
+          </a:p>
+          <a:p>
+            <a:pPr lvl="0"/>
+            <a:r>
+              <a:rPr lang="en-US" dirty="0"/>
+              <a:t>Click a second time on checked items to un-check or un-choose them</a:t>
+            </a:r>
+          </a:p>
+          <a:p>
+            <a:pPr lvl="0"/>
+            <a:r>
+              <a:rPr lang="en-US" dirty="0"/>
+              <a:t>Button on rewards page to go directly back to the chores page</a:t>
             </a:r>
           </a:p>
           <a:p>
@@ -6746,7 +6756,7 @@
             <a:pPr lvl="1"/>
             <a:r>
               <a:rPr lang="en-US" dirty="0"/>
-              <a:t>https://limitless-tor-64679.herokuapp.com/</a:t>
+              <a:t>https://enigmatic-caverns-81757.herokuapp.com/</a:t>
             </a:r>
           </a:p>
           <a:p>

</xml_diff>